<commit_message>
Updated document for AWS Lambda links.
</commit_message>
<xml_diff>
--- a/blob/BriteCore PoC UI Presentation.pptx
+++ b/blob/BriteCore PoC UI Presentation.pptx
@@ -8,23 +8,25 @@
     <p:sldId id="257" r:id="rId2"/>
     <p:sldId id="269" r:id="rId3"/>
     <p:sldId id="275" r:id="rId4"/>
-    <p:sldId id="270" r:id="rId5"/>
-    <p:sldId id="271" r:id="rId6"/>
-    <p:sldId id="272" r:id="rId7"/>
-    <p:sldId id="273" r:id="rId8"/>
-    <p:sldId id="274" r:id="rId9"/>
-    <p:sldId id="258" r:id="rId10"/>
-    <p:sldId id="259" r:id="rId11"/>
-    <p:sldId id="260" r:id="rId12"/>
-    <p:sldId id="261" r:id="rId13"/>
-    <p:sldId id="262" r:id="rId14"/>
-    <p:sldId id="263" r:id="rId15"/>
-    <p:sldId id="264" r:id="rId16"/>
-    <p:sldId id="268" r:id="rId17"/>
-    <p:sldId id="265" r:id="rId18"/>
-    <p:sldId id="256" r:id="rId19"/>
-    <p:sldId id="266" r:id="rId20"/>
-    <p:sldId id="267" r:id="rId21"/>
+    <p:sldId id="276" r:id="rId5"/>
+    <p:sldId id="277" r:id="rId6"/>
+    <p:sldId id="270" r:id="rId7"/>
+    <p:sldId id="271" r:id="rId8"/>
+    <p:sldId id="272" r:id="rId9"/>
+    <p:sldId id="273" r:id="rId10"/>
+    <p:sldId id="274" r:id="rId11"/>
+    <p:sldId id="258" r:id="rId12"/>
+    <p:sldId id="259" r:id="rId13"/>
+    <p:sldId id="260" r:id="rId14"/>
+    <p:sldId id="261" r:id="rId15"/>
+    <p:sldId id="262" r:id="rId16"/>
+    <p:sldId id="263" r:id="rId17"/>
+    <p:sldId id="264" r:id="rId18"/>
+    <p:sldId id="268" r:id="rId19"/>
+    <p:sldId id="265" r:id="rId20"/>
+    <p:sldId id="256" r:id="rId21"/>
+    <p:sldId id="266" r:id="rId22"/>
+    <p:sldId id="267" r:id="rId23"/>
   </p:sldIdLst>
   <p:sldSz cx="9144000" cy="6858000" type="screen4x3"/>
   <p:notesSz cx="6858000" cy="9144000"/>
@@ -308,7 +310,7 @@
             <a:fld id="{CC9A1170-701C-4C31-B563-99A077F1728F}" type="datetimeFigureOut">
               <a:rPr lang="en-US" smtClean="0"/>
               <a:pPr/>
-              <a:t>7/14/2018</a:t>
+              <a:t>12/20/2018</a:t>
             </a:fld>
             <a:endParaRPr lang="en-US"/>
           </a:p>
@@ -475,7 +477,7 @@
             <a:fld id="{CC9A1170-701C-4C31-B563-99A077F1728F}" type="datetimeFigureOut">
               <a:rPr lang="en-US" smtClean="0"/>
               <a:pPr/>
-              <a:t>7/14/2018</a:t>
+              <a:t>12/20/2018</a:t>
             </a:fld>
             <a:endParaRPr lang="en-US"/>
           </a:p>
@@ -652,7 +654,7 @@
             <a:fld id="{CC9A1170-701C-4C31-B563-99A077F1728F}" type="datetimeFigureOut">
               <a:rPr lang="en-US" smtClean="0"/>
               <a:pPr/>
-              <a:t>7/14/2018</a:t>
+              <a:t>12/20/2018</a:t>
             </a:fld>
             <a:endParaRPr lang="en-US"/>
           </a:p>
@@ -819,7 +821,7 @@
             <a:fld id="{CC9A1170-701C-4C31-B563-99A077F1728F}" type="datetimeFigureOut">
               <a:rPr lang="en-US" smtClean="0"/>
               <a:pPr/>
-              <a:t>7/14/2018</a:t>
+              <a:t>12/20/2018</a:t>
             </a:fld>
             <a:endParaRPr lang="en-US"/>
           </a:p>
@@ -1062,7 +1064,7 @@
             <a:fld id="{CC9A1170-701C-4C31-B563-99A077F1728F}" type="datetimeFigureOut">
               <a:rPr lang="en-US" smtClean="0"/>
               <a:pPr/>
-              <a:t>7/14/2018</a:t>
+              <a:t>12/20/2018</a:t>
             </a:fld>
             <a:endParaRPr lang="en-US"/>
           </a:p>
@@ -1347,7 +1349,7 @@
             <a:fld id="{CC9A1170-701C-4C31-B563-99A077F1728F}" type="datetimeFigureOut">
               <a:rPr lang="en-US" smtClean="0"/>
               <a:pPr/>
-              <a:t>7/14/2018</a:t>
+              <a:t>12/20/2018</a:t>
             </a:fld>
             <a:endParaRPr lang="en-US"/>
           </a:p>
@@ -1766,7 +1768,7 @@
             <a:fld id="{CC9A1170-701C-4C31-B563-99A077F1728F}" type="datetimeFigureOut">
               <a:rPr lang="en-US" smtClean="0"/>
               <a:pPr/>
-              <a:t>7/14/2018</a:t>
+              <a:t>12/20/2018</a:t>
             </a:fld>
             <a:endParaRPr lang="en-US"/>
           </a:p>
@@ -1881,7 +1883,7 @@
             <a:fld id="{CC9A1170-701C-4C31-B563-99A077F1728F}" type="datetimeFigureOut">
               <a:rPr lang="en-US" smtClean="0"/>
               <a:pPr/>
-              <a:t>7/14/2018</a:t>
+              <a:t>12/20/2018</a:t>
             </a:fld>
             <a:endParaRPr lang="en-US"/>
           </a:p>
@@ -1973,7 +1975,7 @@
             <a:fld id="{CC9A1170-701C-4C31-B563-99A077F1728F}" type="datetimeFigureOut">
               <a:rPr lang="en-US" smtClean="0"/>
               <a:pPr/>
-              <a:t>7/14/2018</a:t>
+              <a:t>12/20/2018</a:t>
             </a:fld>
             <a:endParaRPr lang="en-US"/>
           </a:p>
@@ -2247,7 +2249,7 @@
             <a:fld id="{CC9A1170-701C-4C31-B563-99A077F1728F}" type="datetimeFigureOut">
               <a:rPr lang="en-US" smtClean="0"/>
               <a:pPr/>
-              <a:t>7/14/2018</a:t>
+              <a:t>12/20/2018</a:t>
             </a:fld>
             <a:endParaRPr lang="en-US"/>
           </a:p>
@@ -2497,7 +2499,7 @@
             <a:fld id="{CC9A1170-701C-4C31-B563-99A077F1728F}" type="datetimeFigureOut">
               <a:rPr lang="en-US" smtClean="0"/>
               <a:pPr/>
-              <a:t>7/14/2018</a:t>
+              <a:t>12/20/2018</a:t>
             </a:fld>
             <a:endParaRPr lang="en-US"/>
           </a:p>
@@ -2707,7 +2709,7 @@
             <a:fld id="{CC9A1170-701C-4C31-B563-99A077F1728F}" type="datetimeFigureOut">
               <a:rPr lang="en-US" smtClean="0"/>
               <a:pPr/>
-              <a:t>7/14/2018</a:t>
+              <a:t>12/20/2018</a:t>
             </a:fld>
             <a:endParaRPr lang="en-US"/>
           </a:p>
@@ -3181,21 +3183,14 @@
             <p:ph type="title"/>
           </p:nvPr>
         </p:nvSpPr>
-        <p:spPr>
-          <a:xfrm>
-            <a:off x="457200" y="274638"/>
-            <a:ext cx="8229600" cy="487362"/>
-          </a:xfrm>
-        </p:spPr>
-        <p:txBody>
-          <a:bodyPr>
-            <a:normAutofit fontScale="90000"/>
-          </a:bodyPr>
-          <a:lstStyle/>
-          <a:p>
-            <a:r>
-              <a:rPr lang="en-US" dirty="0" smtClean="0"/>
-              <a:t>Create Risk Type screen</a:t>
+        <p:spPr/>
+        <p:txBody>
+          <a:bodyPr/>
+          <a:lstStyle/>
+          <a:p>
+            <a:r>
+              <a:rPr lang="en-US" dirty="0" smtClean="0"/>
+              <a:t>Salient features (continued)</a:t>
             </a:r>
             <a:endParaRPr lang="en-US" dirty="0"/>
           </a:p>
@@ -3217,29 +3212,27 @@
           <a:lstStyle/>
           <a:p>
             <a:r>
-              <a:rPr lang="en-US" dirty="0"/>
-              <a:t>Admin User can define Risk types.</a:t>
-            </a:r>
-          </a:p>
-          <a:p>
-            <a:r>
-              <a:rPr lang="en-US" dirty="0" smtClean="0"/>
-              <a:t>User Enters Risk type name and description.</a:t>
-            </a:r>
-          </a:p>
-          <a:p>
-            <a:r>
-              <a:rPr lang="en-US" dirty="0"/>
-              <a:t>Click Add Risk Type Field button to define Risk type fields.</a:t>
-            </a:r>
-          </a:p>
-          <a:p>
-            <a:r>
-              <a:rPr lang="en-US" dirty="0"/>
-              <a:t>Post Risk type after adding / editing Risk type fields.</a:t>
-            </a:r>
-          </a:p>
-          <a:p>
+              <a:rPr lang="en-US" dirty="0" smtClean="0"/>
+              <a:t>Successful model creation messages are displayed using </a:t>
+            </a:r>
+            <a:r>
+              <a:rPr lang="en-US" dirty="0" err="1" smtClean="0"/>
+              <a:t>MessageBox</a:t>
+            </a:r>
+            <a:r>
+              <a:rPr lang="en-US" dirty="0" smtClean="0"/>
+              <a:t>.</a:t>
+            </a:r>
+          </a:p>
+          <a:p>
+            <a:r>
+              <a:rPr lang="en-US" dirty="0" smtClean="0"/>
+              <a:t>Display various model validation errors using </a:t>
+            </a:r>
+            <a:r>
+              <a:rPr lang="en-US" dirty="0" err="1" smtClean="0"/>
+              <a:t>MessageBox</a:t>
+            </a:r>
             <a:endParaRPr lang="en-US" dirty="0"/>
           </a:p>
         </p:txBody>
@@ -3260,6 +3253,206 @@
 </file>
 
 <file path=ppt/slides/slide11.xml><?xml version="1.0" encoding="utf-8"?>
+<p:sld xmlns:a="http://schemas.openxmlformats.org/drawingml/2006/main" xmlns:r="http://schemas.openxmlformats.org/officeDocument/2006/relationships" xmlns:p="http://schemas.openxmlformats.org/presentationml/2006/main">
+  <p:cSld>
+    <p:spTree>
+      <p:nvGrpSpPr>
+        <p:cNvPr id="1" name=""/>
+        <p:cNvGrpSpPr/>
+        <p:nvPr/>
+      </p:nvGrpSpPr>
+      <p:grpSpPr>
+        <a:xfrm>
+          <a:off x="0" y="0"/>
+          <a:ext cx="0" cy="0"/>
+          <a:chOff x="0" y="0"/>
+          <a:chExt cx="0" cy="0"/>
+        </a:xfrm>
+      </p:grpSpPr>
+      <p:sp>
+        <p:nvSpPr>
+          <p:cNvPr id="2" name="Title 1"/>
+          <p:cNvSpPr>
+            <a:spLocks noGrp="1"/>
+          </p:cNvSpPr>
+          <p:nvPr>
+            <p:ph type="title"/>
+          </p:nvPr>
+        </p:nvSpPr>
+        <p:spPr>
+          <a:xfrm>
+            <a:off x="457200" y="274638"/>
+            <a:ext cx="8229600" cy="639762"/>
+          </a:xfrm>
+        </p:spPr>
+        <p:txBody>
+          <a:bodyPr>
+            <a:normAutofit fontScale="90000"/>
+          </a:bodyPr>
+          <a:lstStyle/>
+          <a:p>
+            <a:r>
+              <a:rPr lang="en-US" dirty="0" smtClean="0"/>
+              <a:t>Login Screen</a:t>
+            </a:r>
+            <a:endParaRPr lang="en-US" dirty="0"/>
+          </a:p>
+        </p:txBody>
+      </p:sp>
+      <p:pic>
+        <p:nvPicPr>
+          <p:cNvPr id="3" name="Picture 3"/>
+          <p:cNvPicPr>
+            <a:picLocks noChangeAspect="1" noChangeArrowheads="1"/>
+          </p:cNvPicPr>
+          <p:nvPr/>
+        </p:nvPicPr>
+        <p:blipFill>
+          <a:blip r:embed="rId2"/>
+          <a:srcRect/>
+          <a:stretch>
+            <a:fillRect/>
+          </a:stretch>
+        </p:blipFill>
+        <p:spPr bwMode="auto">
+          <a:xfrm>
+            <a:off x="250825" y="1517650"/>
+            <a:ext cx="8642350" cy="3968750"/>
+          </a:xfrm>
+          <a:prstGeom prst="rect">
+            <a:avLst/>
+          </a:prstGeom>
+          <a:noFill/>
+          <a:ln w="9525">
+            <a:noFill/>
+            <a:miter lim="800000"/>
+            <a:headEnd/>
+            <a:tailEnd/>
+          </a:ln>
+          <a:effectLst/>
+        </p:spPr>
+      </p:pic>
+    </p:spTree>
+  </p:cSld>
+  <p:clrMapOvr>
+    <a:masterClrMapping/>
+  </p:clrMapOvr>
+  <p:timing>
+    <p:tnLst>
+      <p:par>
+        <p:cTn id="1" dur="indefinite" restart="never" nodeType="tmRoot"/>
+      </p:par>
+    </p:tnLst>
+  </p:timing>
+</p:sld>
+</file>
+
+<file path=ppt/slides/slide12.xml><?xml version="1.0" encoding="utf-8"?>
+<p:sld xmlns:a="http://schemas.openxmlformats.org/drawingml/2006/main" xmlns:r="http://schemas.openxmlformats.org/officeDocument/2006/relationships" xmlns:p="http://schemas.openxmlformats.org/presentationml/2006/main">
+  <p:cSld>
+    <p:spTree>
+      <p:nvGrpSpPr>
+        <p:cNvPr id="1" name=""/>
+        <p:cNvGrpSpPr/>
+        <p:nvPr/>
+      </p:nvGrpSpPr>
+      <p:grpSpPr>
+        <a:xfrm>
+          <a:off x="0" y="0"/>
+          <a:ext cx="0" cy="0"/>
+          <a:chOff x="0" y="0"/>
+          <a:chExt cx="0" cy="0"/>
+        </a:xfrm>
+      </p:grpSpPr>
+      <p:sp>
+        <p:nvSpPr>
+          <p:cNvPr id="2" name="Title 1"/>
+          <p:cNvSpPr>
+            <a:spLocks noGrp="1"/>
+          </p:cNvSpPr>
+          <p:nvPr>
+            <p:ph type="title"/>
+          </p:nvPr>
+        </p:nvSpPr>
+        <p:spPr>
+          <a:xfrm>
+            <a:off x="457200" y="274638"/>
+            <a:ext cx="8229600" cy="487362"/>
+          </a:xfrm>
+        </p:spPr>
+        <p:txBody>
+          <a:bodyPr>
+            <a:normAutofit fontScale="90000"/>
+          </a:bodyPr>
+          <a:lstStyle/>
+          <a:p>
+            <a:r>
+              <a:rPr lang="en-US" dirty="0" smtClean="0"/>
+              <a:t>Create Risk Type screen</a:t>
+            </a:r>
+            <a:endParaRPr lang="en-US" dirty="0"/>
+          </a:p>
+        </p:txBody>
+      </p:sp>
+      <p:sp>
+        <p:nvSpPr>
+          <p:cNvPr id="3" name="Content Placeholder 2"/>
+          <p:cNvSpPr>
+            <a:spLocks noGrp="1"/>
+          </p:cNvSpPr>
+          <p:nvPr>
+            <p:ph idx="1"/>
+          </p:nvPr>
+        </p:nvSpPr>
+        <p:spPr/>
+        <p:txBody>
+          <a:bodyPr/>
+          <a:lstStyle/>
+          <a:p>
+            <a:r>
+              <a:rPr lang="en-US" dirty="0"/>
+              <a:t>Admin User can define Risk types.</a:t>
+            </a:r>
+          </a:p>
+          <a:p>
+            <a:r>
+              <a:rPr lang="en-US" dirty="0" smtClean="0"/>
+              <a:t>User Enters Risk type name and description.</a:t>
+            </a:r>
+          </a:p>
+          <a:p>
+            <a:r>
+              <a:rPr lang="en-US" dirty="0"/>
+              <a:t>Click Add Risk Type Field button to define Risk type fields.</a:t>
+            </a:r>
+          </a:p>
+          <a:p>
+            <a:r>
+              <a:rPr lang="en-US" dirty="0"/>
+              <a:t>Post Risk type after adding / editing Risk type fields.</a:t>
+            </a:r>
+          </a:p>
+          <a:p>
+            <a:endParaRPr lang="en-US" dirty="0"/>
+          </a:p>
+        </p:txBody>
+      </p:sp>
+    </p:spTree>
+  </p:cSld>
+  <p:clrMapOvr>
+    <a:masterClrMapping/>
+  </p:clrMapOvr>
+  <p:timing>
+    <p:tnLst>
+      <p:par>
+        <p:cTn id="1" dur="indefinite" restart="never" nodeType="tmRoot"/>
+      </p:par>
+    </p:tnLst>
+  </p:timing>
+</p:sld>
+</file>
+
+<file path=ppt/slides/slide13.xml><?xml version="1.0" encoding="utf-8"?>
 <p:sld xmlns:a="http://schemas.openxmlformats.org/drawingml/2006/main" xmlns:r="http://schemas.openxmlformats.org/officeDocument/2006/relationships" xmlns:p="http://schemas.openxmlformats.org/presentationml/2006/main">
   <p:cSld>
     <p:spTree>
@@ -3354,7 +3547,7 @@
 </p:sld>
 </file>
 
-<file path=ppt/slides/slide12.xml><?xml version="1.0" encoding="utf-8"?>
+<file path=ppt/slides/slide14.xml><?xml version="1.0" encoding="utf-8"?>
 <p:sld xmlns:a="http://schemas.openxmlformats.org/drawingml/2006/main" xmlns:r="http://schemas.openxmlformats.org/officeDocument/2006/relationships" xmlns:p="http://schemas.openxmlformats.org/presentationml/2006/main">
   <p:cSld>
     <p:spTree>
@@ -3449,7 +3642,7 @@
 </p:sld>
 </file>
 
-<file path=ppt/slides/slide13.xml><?xml version="1.0" encoding="utf-8"?>
+<file path=ppt/slides/slide15.xml><?xml version="1.0" encoding="utf-8"?>
 <p:sld xmlns:a="http://schemas.openxmlformats.org/drawingml/2006/main" xmlns:r="http://schemas.openxmlformats.org/officeDocument/2006/relationships" xmlns:p="http://schemas.openxmlformats.org/presentationml/2006/main">
   <p:cSld>
     <p:spTree>
@@ -3554,7 +3747,7 @@
 </p:sld>
 </file>
 
-<file path=ppt/slides/slide14.xml><?xml version="1.0" encoding="utf-8"?>
+<file path=ppt/slides/slide16.xml><?xml version="1.0" encoding="utf-8"?>
 <p:sld xmlns:a="http://schemas.openxmlformats.org/drawingml/2006/main" xmlns:r="http://schemas.openxmlformats.org/officeDocument/2006/relationships" xmlns:p="http://schemas.openxmlformats.org/presentationml/2006/main">
   <p:cSld>
     <p:spTree>
@@ -3649,7 +3842,7 @@
 </p:sld>
 </file>
 
-<file path=ppt/slides/slide15.xml><?xml version="1.0" encoding="utf-8"?>
+<file path=ppt/slides/slide17.xml><?xml version="1.0" encoding="utf-8"?>
 <p:sld xmlns:a="http://schemas.openxmlformats.org/drawingml/2006/main" xmlns:r="http://schemas.openxmlformats.org/officeDocument/2006/relationships" xmlns:p="http://schemas.openxmlformats.org/presentationml/2006/main">
   <p:cSld>
     <p:spTree>
@@ -3744,7 +3937,7 @@
 </p:sld>
 </file>
 
-<file path=ppt/slides/slide16.xml><?xml version="1.0" encoding="utf-8"?>
+<file path=ppt/slides/slide18.xml><?xml version="1.0" encoding="utf-8"?>
 <p:sld xmlns:a="http://schemas.openxmlformats.org/drawingml/2006/main" xmlns:r="http://schemas.openxmlformats.org/officeDocument/2006/relationships" xmlns:p="http://schemas.openxmlformats.org/presentationml/2006/main">
   <p:cSld>
     <p:spTree>
@@ -3832,7 +4025,7 @@
 </p:sld>
 </file>
 
-<file path=ppt/slides/slide17.xml><?xml version="1.0" encoding="utf-8"?>
+<file path=ppt/slides/slide19.xml><?xml version="1.0" encoding="utf-8"?>
 <p:sld xmlns:a="http://schemas.openxmlformats.org/drawingml/2006/main" xmlns:r="http://schemas.openxmlformats.org/officeDocument/2006/relationships" xmlns:p="http://schemas.openxmlformats.org/presentationml/2006/main">
   <p:cSld>
     <p:spTree>
@@ -3924,7 +4117,179 @@
 </p:sld>
 </file>
 
-<file path=ppt/slides/slide18.xml><?xml version="1.0" encoding="utf-8"?>
+<file path=ppt/slides/slide2.xml><?xml version="1.0" encoding="utf-8"?>
+<p:sld xmlns:a="http://schemas.openxmlformats.org/drawingml/2006/main" xmlns:r="http://schemas.openxmlformats.org/officeDocument/2006/relationships" xmlns:p="http://schemas.openxmlformats.org/presentationml/2006/main">
+  <p:cSld>
+    <p:spTree>
+      <p:nvGrpSpPr>
+        <p:cNvPr id="1" name=""/>
+        <p:cNvGrpSpPr/>
+        <p:nvPr/>
+      </p:nvGrpSpPr>
+      <p:grpSpPr>
+        <a:xfrm>
+          <a:off x="0" y="0"/>
+          <a:ext cx="0" cy="0"/>
+          <a:chOff x="0" y="0"/>
+          <a:chExt cx="0" cy="0"/>
+        </a:xfrm>
+      </p:grpSpPr>
+      <p:sp>
+        <p:nvSpPr>
+          <p:cNvPr id="2" name="Title 1"/>
+          <p:cNvSpPr>
+            <a:spLocks noGrp="1"/>
+          </p:cNvSpPr>
+          <p:nvPr>
+            <p:ph type="title"/>
+          </p:nvPr>
+        </p:nvSpPr>
+        <p:spPr/>
+        <p:txBody>
+          <a:bodyPr/>
+          <a:lstStyle/>
+          <a:p>
+            <a:r>
+              <a:rPr lang="en-US" dirty="0" err="1" smtClean="0"/>
+              <a:t>BriteCore</a:t>
+            </a:r>
+            <a:r>
+              <a:rPr lang="en-US" dirty="0" smtClean="0"/>
+              <a:t> </a:t>
+            </a:r>
+            <a:r>
+              <a:rPr lang="en-US" dirty="0" err="1" smtClean="0"/>
+              <a:t>PoC</a:t>
+            </a:r>
+            <a:r>
+              <a:rPr lang="en-US" dirty="0" smtClean="0"/>
+              <a:t> UI</a:t>
+            </a:r>
+            <a:endParaRPr lang="en-US" dirty="0"/>
+          </a:p>
+        </p:txBody>
+      </p:sp>
+      <p:sp>
+        <p:nvSpPr>
+          <p:cNvPr id="3" name="Content Placeholder 2"/>
+          <p:cNvSpPr>
+            <a:spLocks noGrp="1"/>
+          </p:cNvSpPr>
+          <p:nvPr>
+            <p:ph idx="1"/>
+          </p:nvPr>
+        </p:nvSpPr>
+        <p:spPr>
+          <a:xfrm>
+            <a:off x="228600" y="1600200"/>
+            <a:ext cx="8686800" cy="4525963"/>
+          </a:xfrm>
+        </p:spPr>
+        <p:txBody>
+          <a:bodyPr>
+            <a:normAutofit fontScale="92500" lnSpcReduction="10000"/>
+          </a:bodyPr>
+          <a:lstStyle/>
+          <a:p>
+            <a:r>
+              <a:rPr lang="en-US" dirty="0" smtClean="0">
+                <a:hlinkClick r:id="rId2"/>
+              </a:rPr>
+              <a:t>https://</a:t>
+            </a:r>
+            <a:r>
+              <a:rPr lang="en-US" dirty="0" smtClean="0">
+                <a:hlinkClick r:id="rId2"/>
+              </a:rPr>
+              <a:t>d68s5r8jupuq9.cloudfront.net</a:t>
+            </a:r>
+            <a:endParaRPr lang="en-US" dirty="0" smtClean="0"/>
+          </a:p>
+          <a:p>
+            <a:r>
+              <a:rPr lang="en-US" dirty="0" smtClean="0"/>
+              <a:t>Use </a:t>
+            </a:r>
+            <a:r>
+              <a:rPr lang="en-US" dirty="0" smtClean="0"/>
+              <a:t>above link to access UI.</a:t>
+            </a:r>
+          </a:p>
+          <a:p>
+            <a:r>
+              <a:rPr lang="en-US" dirty="0" smtClean="0"/>
+              <a:t>Username :- </a:t>
+            </a:r>
+            <a:r>
+              <a:rPr lang="en-US" dirty="0" err="1" smtClean="0"/>
+              <a:t>phil.reynolds</a:t>
+            </a:r>
+            <a:r>
+              <a:rPr lang="en-US" dirty="0" smtClean="0"/>
+              <a:t> (lower case)</a:t>
+            </a:r>
+          </a:p>
+          <a:p>
+            <a:r>
+              <a:rPr lang="en-US" dirty="0" smtClean="0"/>
+              <a:t>Password :- poctest#1  (lower case)</a:t>
+            </a:r>
+          </a:p>
+          <a:p>
+            <a:r>
+              <a:rPr lang="en-US" dirty="0" smtClean="0"/>
+              <a:t>Best viewed with Firefox with 80 % zoom</a:t>
+            </a:r>
+          </a:p>
+          <a:p>
+            <a:r>
+              <a:rPr lang="en-US" dirty="0" smtClean="0"/>
+              <a:t>Above UI refers Web API at following location credentials are same</a:t>
+            </a:r>
+            <a:r>
+              <a:rPr lang="en-US" dirty="0" smtClean="0"/>
+              <a:t>.</a:t>
+            </a:r>
+          </a:p>
+          <a:p>
+            <a:r>
+              <a:rPr lang="en-US" dirty="0" smtClean="0">
+                <a:hlinkClick r:id="rId3"/>
+              </a:rPr>
+              <a:t>https://</a:t>
+            </a:r>
+            <a:r>
+              <a:rPr lang="en-US" dirty="0" smtClean="0">
+                <a:hlinkClick r:id="rId3"/>
+              </a:rPr>
+              <a:t>2pprl7yzie.execute-api.ap-southeast-1.amazonaws.com/dev</a:t>
+            </a:r>
+            <a:endParaRPr lang="en-US" dirty="0" smtClean="0"/>
+          </a:p>
+          <a:p>
+            <a:endParaRPr lang="en-US" dirty="0" smtClean="0"/>
+          </a:p>
+          <a:p>
+            <a:endParaRPr lang="en-US" dirty="0" smtClean="0"/>
+          </a:p>
+        </p:txBody>
+      </p:sp>
+    </p:spTree>
+  </p:cSld>
+  <p:clrMapOvr>
+    <a:masterClrMapping/>
+  </p:clrMapOvr>
+  <p:timing>
+    <p:tnLst>
+      <p:par>
+        <p:cTn id="1" dur="indefinite" restart="never" nodeType="tmRoot"/>
+      </p:par>
+    </p:tnLst>
+  </p:timing>
+</p:sld>
+</file>
+
+<file path=ppt/slides/slide20.xml><?xml version="1.0" encoding="utf-8"?>
 <p:sld xmlns:a="http://schemas.openxmlformats.org/drawingml/2006/main" xmlns:r="http://schemas.openxmlformats.org/officeDocument/2006/relationships" xmlns:p="http://schemas.openxmlformats.org/presentationml/2006/main">
   <p:cSld>
     <p:spTree>
@@ -4019,7 +4384,7 @@
 </p:sld>
 </file>
 
-<file path=ppt/slides/slide19.xml><?xml version="1.0" encoding="utf-8"?>
+<file path=ppt/slides/slide21.xml><?xml version="1.0" encoding="utf-8"?>
 <p:sld xmlns:a="http://schemas.openxmlformats.org/drawingml/2006/main" xmlns:r="http://schemas.openxmlformats.org/officeDocument/2006/relationships" xmlns:p="http://schemas.openxmlformats.org/presentationml/2006/main">
   <p:cSld>
     <p:spTree>
@@ -4111,153 +4476,7 @@
 </p:sld>
 </file>
 
-<file path=ppt/slides/slide2.xml><?xml version="1.0" encoding="utf-8"?>
-<p:sld xmlns:a="http://schemas.openxmlformats.org/drawingml/2006/main" xmlns:r="http://schemas.openxmlformats.org/officeDocument/2006/relationships" xmlns:p="http://schemas.openxmlformats.org/presentationml/2006/main">
-  <p:cSld>
-    <p:spTree>
-      <p:nvGrpSpPr>
-        <p:cNvPr id="1" name=""/>
-        <p:cNvGrpSpPr/>
-        <p:nvPr/>
-      </p:nvGrpSpPr>
-      <p:grpSpPr>
-        <a:xfrm>
-          <a:off x="0" y="0"/>
-          <a:ext cx="0" cy="0"/>
-          <a:chOff x="0" y="0"/>
-          <a:chExt cx="0" cy="0"/>
-        </a:xfrm>
-      </p:grpSpPr>
-      <p:sp>
-        <p:nvSpPr>
-          <p:cNvPr id="2" name="Title 1"/>
-          <p:cNvSpPr>
-            <a:spLocks noGrp="1"/>
-          </p:cNvSpPr>
-          <p:nvPr>
-            <p:ph type="title"/>
-          </p:nvPr>
-        </p:nvSpPr>
-        <p:spPr/>
-        <p:txBody>
-          <a:bodyPr/>
-          <a:lstStyle/>
-          <a:p>
-            <a:r>
-              <a:rPr lang="en-US" dirty="0" err="1" smtClean="0"/>
-              <a:t>BriteCore</a:t>
-            </a:r>
-            <a:r>
-              <a:rPr lang="en-US" dirty="0" smtClean="0"/>
-              <a:t> </a:t>
-            </a:r>
-            <a:r>
-              <a:rPr lang="en-US" dirty="0" err="1" smtClean="0"/>
-              <a:t>PoC</a:t>
-            </a:r>
-            <a:r>
-              <a:rPr lang="en-US" dirty="0" smtClean="0"/>
-              <a:t> UI</a:t>
-            </a:r>
-            <a:endParaRPr lang="en-US" dirty="0"/>
-          </a:p>
-        </p:txBody>
-      </p:sp>
-      <p:sp>
-        <p:nvSpPr>
-          <p:cNvPr id="3" name="Content Placeholder 2"/>
-          <p:cNvSpPr>
-            <a:spLocks noGrp="1"/>
-          </p:cNvSpPr>
-          <p:nvPr>
-            <p:ph idx="1"/>
-          </p:nvPr>
-        </p:nvSpPr>
-        <p:spPr>
-          <a:xfrm>
-            <a:off x="228600" y="1600200"/>
-            <a:ext cx="8686800" cy="4525963"/>
-          </a:xfrm>
-        </p:spPr>
-        <p:txBody>
-          <a:bodyPr>
-            <a:normAutofit lnSpcReduction="10000"/>
-          </a:bodyPr>
-          <a:lstStyle/>
-          <a:p>
-            <a:r>
-              <a:rPr lang="en-US" dirty="0" smtClean="0">
-                <a:hlinkClick r:id="rId2"/>
-              </a:rPr>
-              <a:t>https://britecore-poc-ui.herokuapp.com/#/login</a:t>
-            </a:r>
-            <a:endParaRPr lang="en-US" dirty="0" smtClean="0"/>
-          </a:p>
-          <a:p>
-            <a:r>
-              <a:rPr lang="en-US" dirty="0" smtClean="0"/>
-              <a:t>Use above link to access UI.</a:t>
-            </a:r>
-          </a:p>
-          <a:p>
-            <a:r>
-              <a:rPr lang="en-US" dirty="0" smtClean="0"/>
-              <a:t>Username :- </a:t>
-            </a:r>
-            <a:r>
-              <a:rPr lang="en-US" dirty="0" err="1" smtClean="0"/>
-              <a:t>phil.reynolds</a:t>
-            </a:r>
-            <a:r>
-              <a:rPr lang="en-US" dirty="0" smtClean="0"/>
-              <a:t> (lower case)</a:t>
-            </a:r>
-          </a:p>
-          <a:p>
-            <a:r>
-              <a:rPr lang="en-US" dirty="0" smtClean="0"/>
-              <a:t>Password :- poctest#1  (lower case)</a:t>
-            </a:r>
-          </a:p>
-          <a:p>
-            <a:r>
-              <a:rPr lang="en-US" dirty="0" smtClean="0"/>
-              <a:t>Best viewed with Firefox with 80 % zoom</a:t>
-            </a:r>
-          </a:p>
-          <a:p>
-            <a:r>
-              <a:rPr lang="en-US" dirty="0" smtClean="0"/>
-              <a:t>Above UI refers Web API at following location credentials are same.</a:t>
-            </a:r>
-          </a:p>
-          <a:p>
-            <a:r>
-              <a:rPr lang="en-US" dirty="0" smtClean="0">
-                <a:hlinkClick r:id="rId3"/>
-              </a:rPr>
-              <a:t>https://britecore-poc-server.herokuapp.com/</a:t>
-            </a:r>
-            <a:endParaRPr lang="en-US" dirty="0"/>
-          </a:p>
-        </p:txBody>
-      </p:sp>
-    </p:spTree>
-  </p:cSld>
-  <p:clrMapOvr>
-    <a:masterClrMapping/>
-  </p:clrMapOvr>
-  <p:timing>
-    <p:tnLst>
-      <p:par>
-        <p:cTn id="1" dur="indefinite" restart="never" nodeType="tmRoot"/>
-      </p:par>
-    </p:tnLst>
-  </p:timing>
-</p:sld>
-</file>
-
-<file path=ppt/slides/slide20.xml><?xml version="1.0" encoding="utf-8"?>
+<file path=ppt/slides/slide22.xml><?xml version="1.0" encoding="utf-8"?>
 <p:sld xmlns:a="http://schemas.openxmlformats.org/drawingml/2006/main" xmlns:r="http://schemas.openxmlformats.org/officeDocument/2006/relationships" xmlns:p="http://schemas.openxmlformats.org/presentationml/2006/main">
   <p:cSld>
     <p:spTree>
@@ -4415,6 +4634,13 @@
   <p:clrMapOvr>
     <a:masterClrMapping/>
   </p:clrMapOvr>
+  <p:timing>
+    <p:tnLst>
+      <p:par>
+        <p:cTn id="1" dur="indefinite" restart="never" nodeType="tmRoot"/>
+      </p:par>
+    </p:tnLst>
+  </p:timing>
 </p:sld>
 </file>
 
@@ -4452,7 +4678,7 @@
           <a:p>
             <a:r>
               <a:rPr lang="en-US" dirty="0" smtClean="0"/>
-              <a:t>Salient features</a:t>
+              <a:t>Unit testing</a:t>
             </a:r>
             <a:endParaRPr lang="en-US" dirty="0"/>
           </a:p>
@@ -4475,7 +4701,43 @@
           <a:p>
             <a:r>
               <a:rPr lang="en-US" dirty="0" smtClean="0"/>
-              <a:t>Developed using </a:t>
+              <a:t>Used </a:t>
+            </a:r>
+            <a:r>
+              <a:rPr lang="en-US" dirty="0" err="1" smtClean="0"/>
+              <a:t>VueJS</a:t>
+            </a:r>
+            <a:r>
+              <a:rPr lang="en-US" dirty="0" smtClean="0"/>
+              <a:t>-test-</a:t>
+            </a:r>
+            <a:r>
+              <a:rPr lang="en-US" dirty="0" err="1" smtClean="0"/>
+              <a:t>utils</a:t>
+            </a:r>
+            <a:r>
+              <a:rPr lang="en-US" dirty="0" smtClean="0"/>
+              <a:t> along with Jest for doing unit testing.</a:t>
+            </a:r>
+          </a:p>
+          <a:p>
+            <a:r>
+              <a:rPr lang="en-US" dirty="0" smtClean="0"/>
+              <a:t> Did Unit testing for </a:t>
+            </a:r>
+            <a:r>
+              <a:rPr lang="en-US" dirty="0" err="1" smtClean="0"/>
+              <a:t>Vuex</a:t>
+            </a:r>
+            <a:r>
+              <a:rPr lang="en-US" dirty="0" smtClean="0"/>
+              <a:t> (Mutation + Action + Getters)</a:t>
+            </a:r>
+          </a:p>
+          <a:p>
+            <a:r>
+              <a:rPr lang="en-US" dirty="0" smtClean="0"/>
+              <a:t>Main </a:t>
             </a:r>
             <a:r>
               <a:rPr lang="en-US" dirty="0" err="1" smtClean="0"/>
@@ -4483,35 +4745,7 @@
             </a:r>
             <a:r>
               <a:rPr lang="en-US" dirty="0" smtClean="0"/>
-              <a:t> JS, ES6, Element UI library, Node JS, Express server.</a:t>
-            </a:r>
-          </a:p>
-          <a:p>
-            <a:r>
-              <a:rPr lang="en-US" dirty="0" smtClean="0"/>
-              <a:t>Only authenticated users can login and access system. Token based </a:t>
-            </a:r>
-            <a:r>
-              <a:rPr lang="en-US" dirty="0" err="1" smtClean="0"/>
-              <a:t>authetication</a:t>
-            </a:r>
-            <a:r>
-              <a:rPr lang="en-US" dirty="0" smtClean="0"/>
-              <a:t> scheme is used.</a:t>
-            </a:r>
-          </a:p>
-          <a:p>
-            <a:r>
-              <a:rPr lang="en-US" dirty="0" smtClean="0"/>
-              <a:t>Role based authorization further limits access to screens and components use for creating </a:t>
-            </a:r>
-            <a:r>
-              <a:rPr lang="en-US" dirty="0" err="1" smtClean="0"/>
-              <a:t>RiskTypes</a:t>
-            </a:r>
-            <a:r>
-              <a:rPr lang="en-US" dirty="0" smtClean="0"/>
-              <a:t>.</a:t>
+              <a:t> components used for showing Single Risk as well as All Risk</a:t>
             </a:r>
             <a:endParaRPr lang="en-US" dirty="0"/>
           </a:p>
@@ -4549,88 +4783,39 @@
           <a:chExt cx="0" cy="0"/>
         </a:xfrm>
       </p:grpSpPr>
-      <p:sp>
-        <p:nvSpPr>
-          <p:cNvPr id="2" name="Title 1"/>
-          <p:cNvSpPr>
-            <a:spLocks noGrp="1"/>
-          </p:cNvSpPr>
-          <p:nvPr>
-            <p:ph type="title"/>
-          </p:nvPr>
-        </p:nvSpPr>
-        <p:spPr/>
-        <p:txBody>
-          <a:bodyPr/>
-          <a:lstStyle/>
-          <a:p>
-            <a:r>
-              <a:rPr lang="en-US" dirty="0" smtClean="0"/>
-              <a:t>Salient features (continued)</a:t>
-            </a:r>
-            <a:endParaRPr lang="en-US" dirty="0"/>
-          </a:p>
-        </p:txBody>
-      </p:sp>
-      <p:sp>
-        <p:nvSpPr>
-          <p:cNvPr id="3" name="Content Placeholder 2"/>
-          <p:cNvSpPr>
-            <a:spLocks noGrp="1"/>
-          </p:cNvSpPr>
-          <p:nvPr>
-            <p:ph idx="1"/>
-          </p:nvPr>
-        </p:nvSpPr>
-        <p:spPr/>
-        <p:txBody>
-          <a:bodyPr/>
-          <a:lstStyle/>
-          <a:p>
-            <a:r>
-              <a:rPr lang="en-US" dirty="0" smtClean="0"/>
-              <a:t>Well thought </a:t>
-            </a:r>
-            <a:r>
-              <a:rPr lang="en-US" dirty="0" err="1" smtClean="0"/>
-              <a:t>Vue</a:t>
-            </a:r>
-            <a:r>
-              <a:rPr lang="en-US" dirty="0" smtClean="0"/>
-              <a:t> components to modularize code.</a:t>
-            </a:r>
-          </a:p>
-          <a:p>
-            <a:r>
-              <a:rPr lang="en-US" dirty="0" smtClean="0"/>
-              <a:t>Each form has help message display that shows how to use screen and detail steps involved.</a:t>
-            </a:r>
-          </a:p>
-          <a:p>
-            <a:r>
-              <a:rPr lang="en-US" dirty="0" smtClean="0"/>
-              <a:t>User can add </a:t>
-            </a:r>
-            <a:r>
-              <a:rPr lang="en-US" dirty="0" err="1" smtClean="0"/>
-              <a:t>RiskType</a:t>
-            </a:r>
-            <a:r>
-              <a:rPr lang="en-US" dirty="0" smtClean="0"/>
-              <a:t> and associated </a:t>
-            </a:r>
-            <a:r>
-              <a:rPr lang="en-US" dirty="0" err="1" smtClean="0"/>
-              <a:t>RiskTypeFields</a:t>
-            </a:r>
-            <a:r>
-              <a:rPr lang="en-US" dirty="0" smtClean="0"/>
-              <a:t> in one go using header and details table in screen.</a:t>
-            </a:r>
-            <a:endParaRPr lang="en-US" dirty="0"/>
-          </a:p>
-        </p:txBody>
-      </p:sp>
+      <p:pic>
+        <p:nvPicPr>
+          <p:cNvPr id="1026" name="Picture 2"/>
+          <p:cNvPicPr>
+            <a:picLocks noChangeAspect="1" noChangeArrowheads="1"/>
+          </p:cNvPicPr>
+          <p:nvPr/>
+        </p:nvPicPr>
+        <p:blipFill>
+          <a:blip r:embed="rId2"/>
+          <a:srcRect/>
+          <a:stretch>
+            <a:fillRect/>
+          </a:stretch>
+        </p:blipFill>
+        <p:spPr bwMode="auto">
+          <a:xfrm>
+            <a:off x="234950" y="457200"/>
+            <a:ext cx="8674100" cy="6400800"/>
+          </a:xfrm>
+          <a:prstGeom prst="rect">
+            <a:avLst/>
+          </a:prstGeom>
+          <a:noFill/>
+          <a:ln w="9525">
+            <a:noFill/>
+            <a:miter lim="800000"/>
+            <a:headEnd/>
+            <a:tailEnd/>
+          </a:ln>
+          <a:effectLst/>
+        </p:spPr>
+      </p:pic>
     </p:spTree>
   </p:cSld>
   <p:clrMapOvr>
@@ -4680,7 +4865,7 @@
           <a:p>
             <a:r>
               <a:rPr lang="en-US" dirty="0" smtClean="0"/>
-              <a:t>Salient features (continued)</a:t>
+              <a:t>Salient features</a:t>
             </a:r>
             <a:endParaRPr lang="en-US" dirty="0"/>
           </a:p>
@@ -4698,29 +4883,49 @@
         </p:nvSpPr>
         <p:spPr/>
         <p:txBody>
-          <a:bodyPr>
-            <a:normAutofit lnSpcReduction="10000"/>
-          </a:bodyPr>
-          <a:lstStyle/>
-          <a:p>
-            <a:r>
-              <a:rPr lang="en-US" dirty="0" smtClean="0"/>
-              <a:t>User can add Risk and Risk Fields in one go using header and details table in screen.</a:t>
-            </a:r>
-          </a:p>
-          <a:p>
-            <a:r>
-              <a:rPr lang="en-US" dirty="0" smtClean="0"/>
-              <a:t>Create Risk Instance screen collect data by dynamically adding controls related to various Risk type fields.</a:t>
-            </a:r>
-          </a:p>
-          <a:p>
-            <a:r>
-              <a:rPr lang="en-US" dirty="0" smtClean="0"/>
-              <a:t>Create Risk Instance screen dynamically adds required field validation and field type specific validation for controls related to Risk type fields. i.e. Date / float / integer.</a:t>
-            </a:r>
-          </a:p>
-          <a:p>
+          <a:bodyPr/>
+          <a:lstStyle/>
+          <a:p>
+            <a:r>
+              <a:rPr lang="en-US" dirty="0" smtClean="0"/>
+              <a:t>Developed using </a:t>
+            </a:r>
+            <a:r>
+              <a:rPr lang="en-US" dirty="0" err="1" smtClean="0"/>
+              <a:t>Vue</a:t>
+            </a:r>
+            <a:r>
+              <a:rPr lang="en-US" dirty="0" smtClean="0"/>
+              <a:t> JS, ES6, Element UI library, Node JS, Express server.</a:t>
+            </a:r>
+          </a:p>
+          <a:p>
+            <a:r>
+              <a:rPr lang="en-US" dirty="0" smtClean="0"/>
+              <a:t>Only authenticated users can login and access system. Token based </a:t>
+            </a:r>
+            <a:r>
+              <a:rPr lang="en-US" dirty="0" err="1" smtClean="0"/>
+              <a:t>authetication</a:t>
+            </a:r>
+            <a:r>
+              <a:rPr lang="en-US" dirty="0" smtClean="0"/>
+              <a:t> scheme is used.</a:t>
+            </a:r>
+          </a:p>
+          <a:p>
+            <a:r>
+              <a:rPr lang="en-US" dirty="0" smtClean="0"/>
+              <a:t>Role based authorization further limits access to screens and components use for creating </a:t>
+            </a:r>
+            <a:r>
+              <a:rPr lang="en-US" dirty="0" err="1" smtClean="0"/>
+              <a:t>RiskTypes</a:t>
+            </a:r>
+            <a:r>
+              <a:rPr lang="en-US" dirty="0" smtClean="0"/>
+              <a:t>.</a:t>
+            </a:r>
             <a:endParaRPr lang="en-US" dirty="0"/>
           </a:p>
         </p:txBody>
@@ -4797,35 +5002,7 @@
           <a:p>
             <a:r>
               <a:rPr lang="en-US" dirty="0" smtClean="0"/>
-              <a:t>View Single Risk allows user to fetch details for given Risk and renders various read-only controls related to Risk Type fields.</a:t>
-            </a:r>
-          </a:p>
-          <a:p>
-            <a:r>
-              <a:rPr lang="en-US" dirty="0" smtClean="0"/>
-              <a:t>Used </a:t>
-            </a:r>
-            <a:r>
-              <a:rPr lang="en-US" dirty="0" err="1" smtClean="0"/>
-              <a:t>Vuex</a:t>
-            </a:r>
-            <a:r>
-              <a:rPr lang="en-US" dirty="0" smtClean="0"/>
-              <a:t> store mutations and action methods. Appropriate use of Getters for sharing </a:t>
-            </a:r>
-            <a:r>
-              <a:rPr lang="en-US" dirty="0" err="1" smtClean="0"/>
-              <a:t>Vuex</a:t>
-            </a:r>
-            <a:r>
-              <a:rPr lang="en-US" dirty="0" smtClean="0"/>
-              <a:t> store with components.</a:t>
-            </a:r>
-          </a:p>
-          <a:p>
-            <a:r>
-              <a:rPr lang="en-US" dirty="0" smtClean="0"/>
-              <a:t>Used </a:t>
+              <a:t>Well thought </a:t>
             </a:r>
             <a:r>
               <a:rPr lang="en-US" dirty="0" err="1" smtClean="0"/>
@@ -4833,18 +5010,36 @@
             </a:r>
             <a:r>
               <a:rPr lang="en-US" dirty="0" smtClean="0"/>
-              <a:t> router for login and navigation within various forms within </a:t>
+              <a:t> components to modularize code.</a:t>
+            </a:r>
+          </a:p>
+          <a:p>
+            <a:r>
+              <a:rPr lang="en-US" dirty="0" smtClean="0"/>
+              <a:t>Each form has help message display that shows how to use screen and detail steps involved.</a:t>
+            </a:r>
+          </a:p>
+          <a:p>
+            <a:r>
+              <a:rPr lang="en-US" dirty="0" smtClean="0"/>
+              <a:t>User can add </a:t>
             </a:r>
             <a:r>
               <a:rPr lang="en-US" dirty="0" err="1" smtClean="0"/>
-              <a:t>WebSite</a:t>
-            </a:r>
-            <a:r>
-              <a:rPr lang="en-US" dirty="0" smtClean="0"/>
-              <a:t>.</a:t>
-            </a:r>
-          </a:p>
-          <a:p>
+              <a:t>RiskType</a:t>
+            </a:r>
+            <a:r>
+              <a:rPr lang="en-US" dirty="0" smtClean="0"/>
+              <a:t> and associated </a:t>
+            </a:r>
+            <a:r>
+              <a:rPr lang="en-US" dirty="0" err="1" smtClean="0"/>
+              <a:t>RiskTypeFields</a:t>
+            </a:r>
+            <a:r>
+              <a:rPr lang="en-US" dirty="0" smtClean="0"/>
+              <a:t> in one go using header and details table in screen.</a:t>
+            </a:r>
             <a:endParaRPr lang="en-US" dirty="0"/>
           </a:p>
         </p:txBody>
@@ -4916,31 +5111,29 @@
         </p:nvSpPr>
         <p:spPr/>
         <p:txBody>
-          <a:bodyPr/>
-          <a:lstStyle/>
-          <a:p>
-            <a:r>
-              <a:rPr lang="en-US" dirty="0" smtClean="0"/>
-              <a:t>Successful model creation messages are displayed using </a:t>
-            </a:r>
-            <a:r>
-              <a:rPr lang="en-US" dirty="0" err="1" smtClean="0"/>
-              <a:t>MessageBox</a:t>
-            </a:r>
-            <a:r>
-              <a:rPr lang="en-US" dirty="0" smtClean="0"/>
-              <a:t>.</a:t>
-            </a:r>
-          </a:p>
-          <a:p>
-            <a:r>
-              <a:rPr lang="en-US" dirty="0" smtClean="0"/>
-              <a:t>Display various model validation errors using </a:t>
-            </a:r>
-            <a:r>
-              <a:rPr lang="en-US" dirty="0" err="1" smtClean="0"/>
-              <a:t>MessageBox</a:t>
-            </a:r>
+          <a:bodyPr>
+            <a:normAutofit lnSpcReduction="10000"/>
+          </a:bodyPr>
+          <a:lstStyle/>
+          <a:p>
+            <a:r>
+              <a:rPr lang="en-US" dirty="0" smtClean="0"/>
+              <a:t>User can add Risk and Risk Fields in one go using header and details table in screen.</a:t>
+            </a:r>
+          </a:p>
+          <a:p>
+            <a:r>
+              <a:rPr lang="en-US" dirty="0" smtClean="0"/>
+              <a:t>Create Risk Instance screen collect data by dynamically adding controls related to various Risk type fields.</a:t>
+            </a:r>
+          </a:p>
+          <a:p>
+            <a:r>
+              <a:rPr lang="en-US" dirty="0" smtClean="0"/>
+              <a:t>Create Risk Instance screen dynamically adds required field validation and field type specific validation for controls related to Risk type fields. i.e. Date / float / integer.</a:t>
+            </a:r>
+          </a:p>
+          <a:p>
             <a:endParaRPr lang="en-US" dirty="0"/>
           </a:p>
         </p:txBody>
@@ -4987,59 +5180,88 @@
             <p:ph type="title"/>
           </p:nvPr>
         </p:nvSpPr>
-        <p:spPr>
-          <a:xfrm>
-            <a:off x="457200" y="274638"/>
-            <a:ext cx="8229600" cy="639762"/>
-          </a:xfrm>
-        </p:spPr>
-        <p:txBody>
-          <a:bodyPr>
-            <a:normAutofit fontScale="90000"/>
-          </a:bodyPr>
-          <a:lstStyle/>
-          <a:p>
-            <a:r>
-              <a:rPr lang="en-US" dirty="0" smtClean="0"/>
-              <a:t>Login Screen</a:t>
+        <p:spPr/>
+        <p:txBody>
+          <a:bodyPr/>
+          <a:lstStyle/>
+          <a:p>
+            <a:r>
+              <a:rPr lang="en-US" dirty="0" smtClean="0"/>
+              <a:t>Salient features (continued)</a:t>
             </a:r>
             <a:endParaRPr lang="en-US" dirty="0"/>
           </a:p>
         </p:txBody>
       </p:sp>
-      <p:pic>
-        <p:nvPicPr>
-          <p:cNvPr id="3" name="Picture 3"/>
-          <p:cNvPicPr>
-            <a:picLocks noChangeAspect="1" noChangeArrowheads="1"/>
-          </p:cNvPicPr>
-          <p:nvPr/>
-        </p:nvPicPr>
-        <p:blipFill>
-          <a:blip r:embed="rId2"/>
-          <a:srcRect/>
-          <a:stretch>
-            <a:fillRect/>
-          </a:stretch>
-        </p:blipFill>
-        <p:spPr bwMode="auto">
-          <a:xfrm>
-            <a:off x="250825" y="1517650"/>
-            <a:ext cx="8642350" cy="3968750"/>
-          </a:xfrm>
-          <a:prstGeom prst="rect">
-            <a:avLst/>
-          </a:prstGeom>
-          <a:noFill/>
-          <a:ln w="9525">
-            <a:noFill/>
-            <a:miter lim="800000"/>
-            <a:headEnd/>
-            <a:tailEnd/>
-          </a:ln>
-          <a:effectLst/>
-        </p:spPr>
-      </p:pic>
+      <p:sp>
+        <p:nvSpPr>
+          <p:cNvPr id="3" name="Content Placeholder 2"/>
+          <p:cNvSpPr>
+            <a:spLocks noGrp="1"/>
+          </p:cNvSpPr>
+          <p:nvPr>
+            <p:ph idx="1"/>
+          </p:nvPr>
+        </p:nvSpPr>
+        <p:spPr/>
+        <p:txBody>
+          <a:bodyPr/>
+          <a:lstStyle/>
+          <a:p>
+            <a:r>
+              <a:rPr lang="en-US" dirty="0" smtClean="0"/>
+              <a:t>View Single Risk allows user to fetch details for given Risk and renders various read-only controls related to Risk Type fields.</a:t>
+            </a:r>
+          </a:p>
+          <a:p>
+            <a:r>
+              <a:rPr lang="en-US" dirty="0" smtClean="0"/>
+              <a:t>Used </a:t>
+            </a:r>
+            <a:r>
+              <a:rPr lang="en-US" dirty="0" err="1" smtClean="0"/>
+              <a:t>Vuex</a:t>
+            </a:r>
+            <a:r>
+              <a:rPr lang="en-US" dirty="0" smtClean="0"/>
+              <a:t> store mutations and action methods. Appropriate use of Getters for sharing </a:t>
+            </a:r>
+            <a:r>
+              <a:rPr lang="en-US" dirty="0" err="1" smtClean="0"/>
+              <a:t>Vuex</a:t>
+            </a:r>
+            <a:r>
+              <a:rPr lang="en-US" dirty="0" smtClean="0"/>
+              <a:t> store with components.</a:t>
+            </a:r>
+          </a:p>
+          <a:p>
+            <a:r>
+              <a:rPr lang="en-US" dirty="0" smtClean="0"/>
+              <a:t>Used </a:t>
+            </a:r>
+            <a:r>
+              <a:rPr lang="en-US" dirty="0" err="1" smtClean="0"/>
+              <a:t>Vue</a:t>
+            </a:r>
+            <a:r>
+              <a:rPr lang="en-US" dirty="0" smtClean="0"/>
+              <a:t> router for login and navigation within various forms within </a:t>
+            </a:r>
+            <a:r>
+              <a:rPr lang="en-US" dirty="0" err="1" smtClean="0"/>
+              <a:t>WebSite</a:t>
+            </a:r>
+            <a:r>
+              <a:rPr lang="en-US" dirty="0" smtClean="0"/>
+              <a:t>.</a:t>
+            </a:r>
+          </a:p>
+          <a:p>
+            <a:endParaRPr lang="en-US" dirty="0"/>
+          </a:p>
+        </p:txBody>
+      </p:sp>
     </p:spTree>
   </p:cSld>
   <p:clrMapOvr>

</xml_diff>